<commit_message>
Notas de clase Ago-26
</commit_message>
<xml_diff>
--- a/02 Presentaciones/02 Tipos de datos.pptx
+++ b/02 Presentaciones/02 Tipos de datos.pptx
@@ -445,7 +445,7 @@
           <a:p>
             <a:fld id="{BA7DA8FB-C99A-46DC-B4EB-C18E7A9E7B9F}" type="datetimeFigureOut">
               <a:rPr lang="en-US" smtClean="0"/>
-              <a:t>1/31/2024</a:t>
+              <a:t>8/20/2024</a:t>
             </a:fld>
             <a:endParaRPr lang="en-US"/>
           </a:p>
@@ -696,7 +696,7 @@
           <a:p>
             <a:fld id="{BA7DA8FB-C99A-46DC-B4EB-C18E7A9E7B9F}" type="datetimeFigureOut">
               <a:rPr lang="en-US" smtClean="0"/>
-              <a:t>1/31/2024</a:t>
+              <a:t>8/20/2024</a:t>
             </a:fld>
             <a:endParaRPr lang="en-US"/>
           </a:p>
@@ -906,7 +906,7 @@
           <a:p>
             <a:fld id="{BA7DA8FB-C99A-46DC-B4EB-C18E7A9E7B9F}" type="datetimeFigureOut">
               <a:rPr lang="en-US" smtClean="0"/>
-              <a:t>1/31/2024</a:t>
+              <a:t>8/20/2024</a:t>
             </a:fld>
             <a:endParaRPr lang="en-US"/>
           </a:p>
@@ -1112,7 +1112,7 @@
             <a:fld id="{BA7DA8FB-C99A-46DC-B4EB-C18E7A9E7B9F}" type="datetimeFigureOut">
               <a:rPr lang="en-US" smtClean="0"/>
               <a:pPr/>
-              <a:t>1/31/2024</a:t>
+              <a:t>8/20/2024</a:t>
             </a:fld>
             <a:endParaRPr lang="en-US" dirty="0"/>
           </a:p>
@@ -1380,7 +1380,7 @@
           <a:p>
             <a:fld id="{BA7DA8FB-C99A-46DC-B4EB-C18E7A9E7B9F}" type="datetimeFigureOut">
               <a:rPr lang="en-US" smtClean="0"/>
-              <a:t>1/31/2024</a:t>
+              <a:t>8/20/2024</a:t>
             </a:fld>
             <a:endParaRPr lang="en-US"/>
           </a:p>
@@ -1656,7 +1656,7 @@
           <a:p>
             <a:fld id="{BA7DA8FB-C99A-46DC-B4EB-C18E7A9E7B9F}" type="datetimeFigureOut">
               <a:rPr lang="en-US" smtClean="0"/>
-              <a:t>1/31/2024</a:t>
+              <a:t>8/20/2024</a:t>
             </a:fld>
             <a:endParaRPr lang="en-US"/>
           </a:p>
@@ -1924,7 +1924,7 @@
           <a:p>
             <a:fld id="{BA7DA8FB-C99A-46DC-B4EB-C18E7A9E7B9F}" type="datetimeFigureOut">
               <a:rPr lang="en-US" smtClean="0"/>
-              <a:t>1/31/2024</a:t>
+              <a:t>8/20/2024</a:t>
             </a:fld>
             <a:endParaRPr lang="en-US"/>
           </a:p>
@@ -2339,7 +2339,7 @@
           <a:p>
             <a:fld id="{BA7DA8FB-C99A-46DC-B4EB-C18E7A9E7B9F}" type="datetimeFigureOut">
               <a:rPr lang="en-US" smtClean="0"/>
-              <a:t>1/31/2024</a:t>
+              <a:t>8/20/2024</a:t>
             </a:fld>
             <a:endParaRPr lang="en-US"/>
           </a:p>
@@ -2452,7 +2452,7 @@
           <a:p>
             <a:fld id="{BA7DA8FB-C99A-46DC-B4EB-C18E7A9E7B9F}" type="datetimeFigureOut">
               <a:rPr lang="en-US" smtClean="0"/>
-              <a:t>1/31/2024</a:t>
+              <a:t>8/20/2024</a:t>
             </a:fld>
             <a:endParaRPr lang="en-US"/>
           </a:p>
@@ -2765,7 +2765,7 @@
           <a:p>
             <a:fld id="{BA7DA8FB-C99A-46DC-B4EB-C18E7A9E7B9F}" type="datetimeFigureOut">
               <a:rPr lang="en-US" smtClean="0"/>
-              <a:t>1/31/2024</a:t>
+              <a:t>8/20/2024</a:t>
             </a:fld>
             <a:endParaRPr lang="en-US"/>
           </a:p>
@@ -3054,7 +3054,7 @@
           <a:p>
             <a:fld id="{BA7DA8FB-C99A-46DC-B4EB-C18E7A9E7B9F}" type="datetimeFigureOut">
               <a:rPr lang="en-US" smtClean="0"/>
-              <a:t>1/31/2024</a:t>
+              <a:t>8/20/2024</a:t>
             </a:fld>
             <a:endParaRPr lang="en-US"/>
           </a:p>
@@ -3297,7 +3297,7 @@
           <a:p>
             <a:fld id="{BA7DA8FB-C99A-46DC-B4EB-C18E7A9E7B9F}" type="datetimeFigureOut">
               <a:rPr lang="en-US" smtClean="0"/>
-              <a:t>1/31/2024</a:t>
+              <a:t>8/20/2024</a:t>
             </a:fld>
             <a:endParaRPr lang="en-US"/>
           </a:p>
@@ -4067,7 +4067,7 @@
             </a:r>
             <a:r>
               <a:rPr lang="es-MX" dirty="0" err="1"/>
-              <a:t>jupyter</a:t>
+              <a:t>pycharm</a:t>
             </a:r>
             <a:endParaRPr lang="en-US" dirty="0"/>
           </a:p>
@@ -4332,7 +4332,7 @@
                     <a:lstStyle/>
                     <a:p>
                       <a:r>
-                        <a:rPr lang="en-US" sz="1500">
+                        <a:rPr lang="en-US" sz="1500" dirty="0">
                           <a:effectLst/>
                         </a:rPr>
                         <a:t>Numeric</a:t>
@@ -4632,7 +4632,7 @@
                     <a:lstStyle/>
                     <a:p>
                       <a:r>
-                        <a:rPr lang="en-US" sz="1500">
+                        <a:rPr lang="en-US" sz="1500" dirty="0">
                           <a:effectLst/>
                         </a:rPr>
                         <a:t>Mapping</a:t>
@@ -4735,7 +4735,7 @@
                     <a:lstStyle/>
                     <a:p>
                       <a:r>
-                        <a:rPr lang="en-US" sz="1500">
+                        <a:rPr lang="en-US" sz="1500" dirty="0">
                           <a:effectLst/>
                         </a:rPr>
                         <a:t>Boolean</a:t>
@@ -4766,7 +4766,7 @@
                     <a:lstStyle/>
                     <a:p>
                       <a:r>
-                        <a:rPr lang="en-US" sz="1500">
+                        <a:rPr lang="en-US" sz="1500" dirty="0">
                           <a:effectLst/>
                         </a:rPr>
                         <a:t>bool</a:t>
@@ -4866,11 +4866,20 @@
                     <a:lstStyle/>
                     <a:p>
                       <a:r>
-                        <a:rPr lang="en-US" sz="1500">
+                        <a:rPr lang="en-US" sz="1500" dirty="0">
                           <a:effectLst/>
                         </a:rPr>
-                        <a:t>set, frozeenset</a:t>
+                        <a:t>set, </a:t>
                       </a:r>
+                      <a:r>
+                        <a:rPr lang="en-US" sz="1500" dirty="0" err="1">
+                          <a:effectLst/>
+                        </a:rPr>
+                        <a:t>frozeenset</a:t>
+                      </a:r>
+                      <a:endParaRPr lang="en-US" sz="1500" dirty="0">
+                        <a:effectLst/>
+                      </a:endParaRPr>
                     </a:p>
                   </a:txBody>
                   <a:tcPr marL="155405" marR="155405" marT="77702" marB="77702" anchor="ctr">

</xml_diff>

<commit_message>
Notas de clase Ago-26 v2
</commit_message>
<xml_diff>
--- a/02 Presentaciones/02 Tipos de datos.pptx
+++ b/02 Presentaciones/02 Tipos de datos.pptx
@@ -445,7 +445,7 @@
           <a:p>
             <a:fld id="{BA7DA8FB-C99A-46DC-B4EB-C18E7A9E7B9F}" type="datetimeFigureOut">
               <a:rPr lang="en-US" smtClean="0"/>
-              <a:t>8/20/2024</a:t>
+              <a:t>8/26/2024</a:t>
             </a:fld>
             <a:endParaRPr lang="en-US"/>
           </a:p>
@@ -696,7 +696,7 @@
           <a:p>
             <a:fld id="{BA7DA8FB-C99A-46DC-B4EB-C18E7A9E7B9F}" type="datetimeFigureOut">
               <a:rPr lang="en-US" smtClean="0"/>
-              <a:t>8/20/2024</a:t>
+              <a:t>8/26/2024</a:t>
             </a:fld>
             <a:endParaRPr lang="en-US"/>
           </a:p>
@@ -906,7 +906,7 @@
           <a:p>
             <a:fld id="{BA7DA8FB-C99A-46DC-B4EB-C18E7A9E7B9F}" type="datetimeFigureOut">
               <a:rPr lang="en-US" smtClean="0"/>
-              <a:t>8/20/2024</a:t>
+              <a:t>8/26/2024</a:t>
             </a:fld>
             <a:endParaRPr lang="en-US"/>
           </a:p>
@@ -1112,7 +1112,7 @@
             <a:fld id="{BA7DA8FB-C99A-46DC-B4EB-C18E7A9E7B9F}" type="datetimeFigureOut">
               <a:rPr lang="en-US" smtClean="0"/>
               <a:pPr/>
-              <a:t>8/20/2024</a:t>
+              <a:t>8/26/2024</a:t>
             </a:fld>
             <a:endParaRPr lang="en-US" dirty="0"/>
           </a:p>
@@ -1380,7 +1380,7 @@
           <a:p>
             <a:fld id="{BA7DA8FB-C99A-46DC-B4EB-C18E7A9E7B9F}" type="datetimeFigureOut">
               <a:rPr lang="en-US" smtClean="0"/>
-              <a:t>8/20/2024</a:t>
+              <a:t>8/26/2024</a:t>
             </a:fld>
             <a:endParaRPr lang="en-US"/>
           </a:p>
@@ -1656,7 +1656,7 @@
           <a:p>
             <a:fld id="{BA7DA8FB-C99A-46DC-B4EB-C18E7A9E7B9F}" type="datetimeFigureOut">
               <a:rPr lang="en-US" smtClean="0"/>
-              <a:t>8/20/2024</a:t>
+              <a:t>8/26/2024</a:t>
             </a:fld>
             <a:endParaRPr lang="en-US"/>
           </a:p>
@@ -1924,7 +1924,7 @@
           <a:p>
             <a:fld id="{BA7DA8FB-C99A-46DC-B4EB-C18E7A9E7B9F}" type="datetimeFigureOut">
               <a:rPr lang="en-US" smtClean="0"/>
-              <a:t>8/20/2024</a:t>
+              <a:t>8/26/2024</a:t>
             </a:fld>
             <a:endParaRPr lang="en-US"/>
           </a:p>
@@ -2339,7 +2339,7 @@
           <a:p>
             <a:fld id="{BA7DA8FB-C99A-46DC-B4EB-C18E7A9E7B9F}" type="datetimeFigureOut">
               <a:rPr lang="en-US" smtClean="0"/>
-              <a:t>8/20/2024</a:t>
+              <a:t>8/26/2024</a:t>
             </a:fld>
             <a:endParaRPr lang="en-US"/>
           </a:p>
@@ -2452,7 +2452,7 @@
           <a:p>
             <a:fld id="{BA7DA8FB-C99A-46DC-B4EB-C18E7A9E7B9F}" type="datetimeFigureOut">
               <a:rPr lang="en-US" smtClean="0"/>
-              <a:t>8/20/2024</a:t>
+              <a:t>8/26/2024</a:t>
             </a:fld>
             <a:endParaRPr lang="en-US"/>
           </a:p>
@@ -2765,7 +2765,7 @@
           <a:p>
             <a:fld id="{BA7DA8FB-C99A-46DC-B4EB-C18E7A9E7B9F}" type="datetimeFigureOut">
               <a:rPr lang="en-US" smtClean="0"/>
-              <a:t>8/20/2024</a:t>
+              <a:t>8/26/2024</a:t>
             </a:fld>
             <a:endParaRPr lang="en-US"/>
           </a:p>
@@ -3054,7 +3054,7 @@
           <a:p>
             <a:fld id="{BA7DA8FB-C99A-46DC-B4EB-C18E7A9E7B9F}" type="datetimeFigureOut">
               <a:rPr lang="en-US" smtClean="0"/>
-              <a:t>8/20/2024</a:t>
+              <a:t>8/26/2024</a:t>
             </a:fld>
             <a:endParaRPr lang="en-US"/>
           </a:p>
@@ -3297,7 +3297,7 @@
           <a:p>
             <a:fld id="{BA7DA8FB-C99A-46DC-B4EB-C18E7A9E7B9F}" type="datetimeFigureOut">
               <a:rPr lang="en-US" smtClean="0"/>
-              <a:t>8/20/2024</a:t>
+              <a:t>8/26/2024</a:t>
             </a:fld>
             <a:endParaRPr lang="en-US"/>
           </a:p>
@@ -4186,7 +4186,7 @@
           <p:nvPr>
             <p:extLst>
               <p:ext uri="{D42A27DB-BD31-4B8C-83A1-F6EECF244321}">
-                <p14:modId xmlns:p14="http://schemas.microsoft.com/office/powerpoint/2010/main" val="4036912538"/>
+                <p14:modId xmlns:p14="http://schemas.microsoft.com/office/powerpoint/2010/main" val="1531899689"/>
               </p:ext>
             </p:extLst>
           </p:nvPr>
@@ -4999,27 +4999,77 @@
           <a:p>
             <a:r>
               <a:rPr lang="es-MX" dirty="0"/>
-              <a:t>Ver </a:t>
-            </a:r>
-            <a:r>
-              <a:rPr lang="es-MX" b="1" dirty="0"/>
-              <a:t>Data </a:t>
-            </a:r>
-            <a:r>
-              <a:rPr lang="es-MX" b="1" dirty="0" err="1"/>
-              <a:t>types</a:t>
-            </a:r>
-            <a:r>
-              <a:rPr lang="es-MX" b="1" dirty="0"/>
-              <a:t> </a:t>
-            </a:r>
+              <a:t>Características de las estructuras de datos</a:t>
+            </a:r>
+            <a:endParaRPr lang="en-US" dirty="0"/>
+          </a:p>
+        </p:txBody>
+      </p:sp>
+      <p:sp>
+        <p:nvSpPr>
+          <p:cNvPr id="3" name="CuadroTexto 2">
+            <a:extLst>
+              <a:ext uri="{FF2B5EF4-FFF2-40B4-BE49-F238E27FC236}">
+                <a16:creationId xmlns:a16="http://schemas.microsoft.com/office/drawing/2014/main" id="{A24015C1-10D6-B594-8792-2F7F0E88555E}"/>
+              </a:ext>
+            </a:extLst>
+          </p:cNvPr>
+          <p:cNvSpPr txBox="1"/>
+          <p:nvPr/>
+        </p:nvSpPr>
+        <p:spPr>
+          <a:xfrm>
+            <a:off x="1445846" y="3266831"/>
+            <a:ext cx="5822462" cy="1200329"/>
+          </a:xfrm>
+          <a:prstGeom prst="rect">
+            <a:avLst/>
+          </a:prstGeom>
+          <a:noFill/>
+        </p:spPr>
+        <p:txBody>
+          <a:bodyPr wrap="square" rtlCol="0">
+            <a:spAutoFit/>
+          </a:bodyPr>
+          <a:lstStyle/>
+          <a:p>
+            <a:pPr marL="285750" indent="-285750">
+              <a:buFontTx/>
+              <a:buChar char="-"/>
+            </a:pPr>
             <a:r>
               <a:rPr lang="es-MX" dirty="0"/>
-              <a:t>en </a:t>
-            </a:r>
-            <a:r>
-              <a:rPr lang="es-MX" dirty="0" err="1"/>
-              <a:t>jupyter</a:t>
+              <a:t>Indexado</a:t>
+            </a:r>
+          </a:p>
+          <a:p>
+            <a:pPr marL="285750" indent="-285750">
+              <a:buFontTx/>
+              <a:buChar char="-"/>
+            </a:pPr>
+            <a:r>
+              <a:rPr lang="es-MX" dirty="0"/>
+              <a:t>Ordenamiento</a:t>
+            </a:r>
+          </a:p>
+          <a:p>
+            <a:pPr marL="285750" indent="-285750">
+              <a:buFontTx/>
+              <a:buChar char="-"/>
+            </a:pPr>
+            <a:r>
+              <a:rPr lang="es-MX" dirty="0"/>
+              <a:t>Mudable</a:t>
+            </a:r>
+          </a:p>
+          <a:p>
+            <a:pPr marL="285750" indent="-285750">
+              <a:buFontTx/>
+              <a:buChar char="-"/>
+            </a:pPr>
+            <a:r>
+              <a:rPr lang="es-MX" dirty="0"/>
+              <a:t>Duplicados</a:t>
             </a:r>
             <a:endParaRPr lang="en-US" dirty="0"/>
           </a:p>

</xml_diff>